<commit_message>
Updating adjustment factor powerpoint
</commit_message>
<xml_diff>
--- a/Presentations/Adjustment_Factors.pptx
+++ b/Presentations/Adjustment_Factors.pptx
@@ -7,6 +7,13 @@
   <p:sldIdLst>
     <p:sldId id="256" r:id="rId2"/>
     <p:sldId id="257" r:id="rId3"/>
+    <p:sldId id="258" r:id="rId4"/>
+    <p:sldId id="259" r:id="rId5"/>
+    <p:sldId id="260" r:id="rId6"/>
+    <p:sldId id="261" r:id="rId7"/>
+    <p:sldId id="262" r:id="rId8"/>
+    <p:sldId id="263" r:id="rId9"/>
+    <p:sldId id="264" r:id="rId10"/>
   </p:sldIdLst>
   <p:sldSz cx="12192000" cy="6858000"/>
   <p:notesSz cx="6858000" cy="9144000"/>
@@ -105,6 +112,11 @@
       </a:defRPr>
     </a:lvl9pPr>
   </p:defaultTextStyle>
+  <p:extLst>
+    <p:ext uri="{EFAFB233-063F-42B5-8137-9DF3F51BA10A}">
+      <p15:sldGuideLst xmlns:p15="http://schemas.microsoft.com/office/powerpoint/2012/main"/>
+    </p:ext>
+  </p:extLst>
 </p:presentation>
 </file>
 
@@ -278,7 +290,7 @@
           <a:p>
             <a:fld id="{2B48E2E9-A25B-CF49-8A46-969EC21E09EB}" type="datetimeFigureOut">
               <a:rPr lang="en-US" smtClean="0"/>
-              <a:t>8/23/22</a:t>
+              <a:t>8/29/22</a:t>
             </a:fld>
             <a:endParaRPr lang="en-US"/>
           </a:p>
@@ -545,7 +557,7 @@
           <a:p>
             <a:fld id="{2B48E2E9-A25B-CF49-8A46-969EC21E09EB}" type="datetimeFigureOut">
               <a:rPr lang="en-US" smtClean="0"/>
-              <a:t>8/23/22</a:t>
+              <a:t>8/29/22</a:t>
             </a:fld>
             <a:endParaRPr lang="en-US"/>
           </a:p>
@@ -776,7 +788,7 @@
           <a:p>
             <a:fld id="{2B48E2E9-A25B-CF49-8A46-969EC21E09EB}" type="datetimeFigureOut">
               <a:rPr lang="en-US" smtClean="0"/>
-              <a:t>8/23/22</a:t>
+              <a:t>8/29/22</a:t>
             </a:fld>
             <a:endParaRPr lang="en-US"/>
           </a:p>
@@ -1086,7 +1098,7 @@
           <a:p>
             <a:fld id="{2B48E2E9-A25B-CF49-8A46-969EC21E09EB}" type="datetimeFigureOut">
               <a:rPr lang="en-US" smtClean="0"/>
-              <a:t>8/23/22</a:t>
+              <a:t>8/29/22</a:t>
             </a:fld>
             <a:endParaRPr lang="en-US"/>
           </a:p>
@@ -1559,7 +1571,7 @@
           <a:p>
             <a:fld id="{2B48E2E9-A25B-CF49-8A46-969EC21E09EB}" type="datetimeFigureOut">
               <a:rPr lang="en-US" smtClean="0"/>
-              <a:t>8/23/22</a:t>
+              <a:t>8/29/22</a:t>
             </a:fld>
             <a:endParaRPr lang="en-US"/>
           </a:p>
@@ -2106,7 +2118,7 @@
           <a:p>
             <a:fld id="{2B48E2E9-A25B-CF49-8A46-969EC21E09EB}" type="datetimeFigureOut">
               <a:rPr lang="en-US" smtClean="0"/>
-              <a:t>8/23/22</a:t>
+              <a:t>8/29/22</a:t>
             </a:fld>
             <a:endParaRPr lang="en-US"/>
           </a:p>
@@ -2880,7 +2892,7 @@
           <a:p>
             <a:fld id="{2B48E2E9-A25B-CF49-8A46-969EC21E09EB}" type="datetimeFigureOut">
               <a:rPr lang="en-US" smtClean="0"/>
-              <a:t>8/23/22</a:t>
+              <a:t>8/29/22</a:t>
             </a:fld>
             <a:endParaRPr lang="en-US"/>
           </a:p>
@@ -3055,7 +3067,7 @@
           <a:p>
             <a:fld id="{2B48E2E9-A25B-CF49-8A46-969EC21E09EB}" type="datetimeFigureOut">
               <a:rPr lang="en-US" smtClean="0"/>
-              <a:t>8/23/22</a:t>
+              <a:t>8/29/22</a:t>
             </a:fld>
             <a:endParaRPr lang="en-US"/>
           </a:p>
@@ -3278,7 +3290,7 @@
           <a:p>
             <a:fld id="{2B48E2E9-A25B-CF49-8A46-969EC21E09EB}" type="datetimeFigureOut">
               <a:rPr lang="en-US" smtClean="0"/>
-              <a:t>8/23/22</a:t>
+              <a:t>8/29/22</a:t>
             </a:fld>
             <a:endParaRPr lang="en-US"/>
           </a:p>
@@ -3458,7 +3470,7 @@
           <a:p>
             <a:fld id="{2B48E2E9-A25B-CF49-8A46-969EC21E09EB}" type="datetimeFigureOut">
               <a:rPr lang="en-US" smtClean="0"/>
-              <a:t>8/23/22</a:t>
+              <a:t>8/29/22</a:t>
             </a:fld>
             <a:endParaRPr lang="en-US"/>
           </a:p>
@@ -3747,7 +3759,7 @@
           <a:p>
             <a:fld id="{2B48E2E9-A25B-CF49-8A46-969EC21E09EB}" type="datetimeFigureOut">
               <a:rPr lang="en-US" smtClean="0"/>
-              <a:t>8/23/22</a:t>
+              <a:t>8/29/22</a:t>
             </a:fld>
             <a:endParaRPr lang="en-US"/>
           </a:p>
@@ -3989,7 +4001,7 @@
           <a:p>
             <a:fld id="{2B48E2E9-A25B-CF49-8A46-969EC21E09EB}" type="datetimeFigureOut">
               <a:rPr lang="en-US" smtClean="0"/>
-              <a:t>8/23/22</a:t>
+              <a:t>8/29/22</a:t>
             </a:fld>
             <a:endParaRPr lang="en-US"/>
           </a:p>
@@ -4368,7 +4380,7 @@
           <a:p>
             <a:fld id="{2B48E2E9-A25B-CF49-8A46-969EC21E09EB}" type="datetimeFigureOut">
               <a:rPr lang="en-US" smtClean="0"/>
-              <a:t>8/23/22</a:t>
+              <a:t>8/29/22</a:t>
             </a:fld>
             <a:endParaRPr lang="en-US"/>
           </a:p>
@@ -4486,7 +4498,7 @@
           <a:p>
             <a:fld id="{2B48E2E9-A25B-CF49-8A46-969EC21E09EB}" type="datetimeFigureOut">
               <a:rPr lang="en-US" smtClean="0"/>
-              <a:t>8/23/22</a:t>
+              <a:t>8/29/22</a:t>
             </a:fld>
             <a:endParaRPr lang="en-US"/>
           </a:p>
@@ -4581,7 +4593,7 @@
           <a:p>
             <a:fld id="{2B48E2E9-A25B-CF49-8A46-969EC21E09EB}" type="datetimeFigureOut">
               <a:rPr lang="en-US" smtClean="0"/>
-              <a:t>8/23/22</a:t>
+              <a:t>8/29/22</a:t>
             </a:fld>
             <a:endParaRPr lang="en-US"/>
           </a:p>
@@ -4830,7 +4842,7 @@
           <a:p>
             <a:fld id="{2B48E2E9-A25B-CF49-8A46-969EC21E09EB}" type="datetimeFigureOut">
               <a:rPr lang="en-US" smtClean="0"/>
-              <a:t>8/23/22</a:t>
+              <a:t>8/29/22</a:t>
             </a:fld>
             <a:endParaRPr lang="en-US"/>
           </a:p>
@@ -5087,7 +5099,7 @@
           <a:p>
             <a:fld id="{2B48E2E9-A25B-CF49-8A46-969EC21E09EB}" type="datetimeFigureOut">
               <a:rPr lang="en-US" smtClean="0"/>
-              <a:t>8/23/22</a:t>
+              <a:t>8/29/22</a:t>
             </a:fld>
             <a:endParaRPr lang="en-US"/>
           </a:p>
@@ -5330,7 +5342,7 @@
           <a:p>
             <a:fld id="{2B48E2E9-A25B-CF49-8A46-969EC21E09EB}" type="datetimeFigureOut">
               <a:rPr lang="en-US" smtClean="0"/>
-              <a:t>8/23/22</a:t>
+              <a:t>8/29/22</a:t>
             </a:fld>
             <a:endParaRPr lang="en-US"/>
           </a:p>
@@ -5891,14 +5903,1076 @@
           <a:bodyPr/>
           <a:lstStyle/>
           <a:p>
-            <a:endParaRPr lang="en-US"/>
-          </a:p>
-        </p:txBody>
-      </p:sp>
+            <a:r>
+              <a:rPr lang="en-US" dirty="0"/>
+              <a:t>Initially, we wanted to match the backfire rate of spread in the simulation to the observed backfire rate of spread</a:t>
+            </a:r>
+          </a:p>
+          <a:p>
+            <a:r>
+              <a:rPr lang="en-US" dirty="0"/>
+              <a:t>To calculate the observed backfire rate of spread, I used videos of the burn and google earth to calculate the backfire rate of spread</a:t>
+            </a:r>
+          </a:p>
+          <a:p>
+            <a:r>
+              <a:rPr lang="en-US" dirty="0"/>
+              <a:t>A more in depth explanation of how this was calculated can be found on </a:t>
+            </a:r>
+            <a:r>
+              <a:rPr lang="en-US" dirty="0" err="1"/>
+              <a:t>youtube</a:t>
+            </a:r>
+            <a:r>
+              <a:rPr lang="en-US" dirty="0"/>
+              <a:t> at: INSERT LINK HERE</a:t>
+            </a:r>
+          </a:p>
+          <a:p>
+            <a:r>
+              <a:rPr lang="en-US" dirty="0"/>
+              <a:t>As an attempt to match the simulations to the observed backfire rate of spread, we added in an adjr0 adjustment factor to the </a:t>
+            </a:r>
+            <a:r>
+              <a:rPr lang="en-US" dirty="0" err="1"/>
+              <a:t>namelist.fire</a:t>
+            </a:r>
+            <a:r>
+              <a:rPr lang="en-US" dirty="0"/>
+              <a:t> to slow down the simulation</a:t>
+            </a:r>
+          </a:p>
+          <a:p>
+            <a:endParaRPr lang="en-US" dirty="0"/>
+          </a:p>
+          <a:p>
+            <a:pPr marL="0" indent="0">
+              <a:buNone/>
+            </a:pPr>
+            <a:endParaRPr lang="en-US" dirty="0"/>
+          </a:p>
+          <a:p>
+            <a:pPr marL="0" indent="0">
+              <a:buNone/>
+            </a:pPr>
+            <a:endParaRPr lang="en-US" dirty="0"/>
+          </a:p>
+          <a:p>
+            <a:pPr marL="0" indent="0">
+              <a:buNone/>
+            </a:pPr>
+            <a:endParaRPr lang="en-US" dirty="0"/>
+          </a:p>
+        </p:txBody>
+      </p:sp>
+      <p:pic>
+        <p:nvPicPr>
+          <p:cNvPr id="4" name="Picture 3">
+            <a:extLst>
+              <a:ext uri="{FF2B5EF4-FFF2-40B4-BE49-F238E27FC236}">
+                <a16:creationId xmlns:a16="http://schemas.microsoft.com/office/drawing/2014/main" id="{D1C84B33-0E69-F116-92BA-B219569D37C6}"/>
+              </a:ext>
+            </a:extLst>
+          </p:cNvPr>
+          <p:cNvPicPr>
+            <a:picLocks noChangeAspect="1"/>
+          </p:cNvPicPr>
+          <p:nvPr/>
+        </p:nvPicPr>
+        <p:blipFill>
+          <a:blip r:embed="rId2"/>
+          <a:stretch>
+            <a:fillRect/>
+          </a:stretch>
+        </p:blipFill>
+        <p:spPr>
+          <a:xfrm>
+            <a:off x="768131" y="5689855"/>
+            <a:ext cx="3403600" cy="406400"/>
+          </a:xfrm>
+          <a:prstGeom prst="rect">
+            <a:avLst/>
+          </a:prstGeom>
+        </p:spPr>
+      </p:pic>
     </p:spTree>
     <p:extLst>
       <p:ext uri="{BB962C8B-B14F-4D97-AF65-F5344CB8AC3E}">
         <p14:creationId xmlns:p14="http://schemas.microsoft.com/office/powerpoint/2010/main" val="3178772796"/>
+      </p:ext>
+    </p:extLst>
+  </p:cSld>
+  <p:clrMapOvr>
+    <a:masterClrMapping/>
+  </p:clrMapOvr>
+</p:sld>
+</file>
+
+<file path=ppt/slides/slide3.xml><?xml version="1.0" encoding="utf-8"?>
+<p:sld xmlns:a="http://schemas.openxmlformats.org/drawingml/2006/main" xmlns:r="http://schemas.openxmlformats.org/officeDocument/2006/relationships" xmlns:p="http://schemas.openxmlformats.org/presentationml/2006/main">
+  <p:cSld>
+    <p:spTree>
+      <p:nvGrpSpPr>
+        <p:cNvPr id="1" name=""/>
+        <p:cNvGrpSpPr/>
+        <p:nvPr/>
+      </p:nvGrpSpPr>
+      <p:grpSpPr>
+        <a:xfrm>
+          <a:off x="0" y="0"/>
+          <a:ext cx="0" cy="0"/>
+          <a:chOff x="0" y="0"/>
+          <a:chExt cx="0" cy="0"/>
+        </a:xfrm>
+      </p:grpSpPr>
+      <p:sp>
+        <p:nvSpPr>
+          <p:cNvPr id="2" name="Title 1">
+            <a:extLst>
+              <a:ext uri="{FF2B5EF4-FFF2-40B4-BE49-F238E27FC236}">
+                <a16:creationId xmlns:a16="http://schemas.microsoft.com/office/drawing/2014/main" id="{90E0E0DE-DDE0-D901-F03F-DB18775955BF}"/>
+              </a:ext>
+            </a:extLst>
+          </p:cNvPr>
+          <p:cNvSpPr>
+            <a:spLocks noGrp="1"/>
+          </p:cNvSpPr>
+          <p:nvPr>
+            <p:ph type="title"/>
+          </p:nvPr>
+        </p:nvSpPr>
+        <p:spPr/>
+        <p:txBody>
+          <a:bodyPr/>
+          <a:lstStyle/>
+          <a:p>
+            <a:r>
+              <a:rPr lang="en-US" dirty="0"/>
+              <a:t>ADjr0 adjustments in </a:t>
+            </a:r>
+            <a:r>
+              <a:rPr lang="en-US" dirty="0" err="1"/>
+              <a:t>wrf-sfire</a:t>
+            </a:r>
+            <a:endParaRPr lang="en-US" dirty="0"/>
+          </a:p>
+        </p:txBody>
+      </p:sp>
+      <p:sp>
+        <p:nvSpPr>
+          <p:cNvPr id="3" name="Content Placeholder 2">
+            <a:extLst>
+              <a:ext uri="{FF2B5EF4-FFF2-40B4-BE49-F238E27FC236}">
+                <a16:creationId xmlns:a16="http://schemas.microsoft.com/office/drawing/2014/main" id="{72F6BC60-8D5D-CE47-D699-B2F4DC234159}"/>
+              </a:ext>
+            </a:extLst>
+          </p:cNvPr>
+          <p:cNvSpPr>
+            <a:spLocks noGrp="1"/>
+          </p:cNvSpPr>
+          <p:nvPr>
+            <p:ph idx="1"/>
+          </p:nvPr>
+        </p:nvSpPr>
+        <p:spPr/>
+        <p:txBody>
+          <a:bodyPr/>
+          <a:lstStyle/>
+          <a:p>
+            <a:r>
+              <a:rPr lang="en-US" dirty="0"/>
+              <a:t>The observed backfire ROS was about 0.02m/s, and the simulation was at 0.021 m/s</a:t>
+            </a:r>
+          </a:p>
+          <a:p>
+            <a:r>
+              <a:rPr lang="en-US" dirty="0"/>
+              <a:t>In an attempt to slow the simulation down, an adjustment factor was added to the simulation </a:t>
+            </a:r>
+          </a:p>
+          <a:p>
+            <a:pPr lvl="1"/>
+            <a:r>
+              <a:rPr lang="en-US" dirty="0"/>
+              <a:t>The adjustment factor used in the initial run is 0.90</a:t>
+            </a:r>
+          </a:p>
+          <a:p>
+            <a:r>
+              <a:rPr lang="en-US" dirty="0"/>
+              <a:t>With this adjustment factor, we were expecting the backfire ROS to be closer to 0.02, but instead the new backfire ROS was calculated to be 0.015m/s</a:t>
+            </a:r>
+          </a:p>
+          <a:p>
+            <a:r>
+              <a:rPr lang="en-US" dirty="0"/>
+              <a:t>To try to better correct the model, another run was performed this time with a different adjustment factor of 0.93</a:t>
+            </a:r>
+          </a:p>
+          <a:p>
+            <a:r>
+              <a:rPr lang="en-US" dirty="0"/>
+              <a:t>This did increase the backfire ROS, but not as much as we had hoped</a:t>
+            </a:r>
+          </a:p>
+          <a:p>
+            <a:pPr lvl="1"/>
+            <a:r>
+              <a:rPr lang="en-US" dirty="0"/>
+              <a:t>The new backfire ROS was 0.016</a:t>
+            </a:r>
+          </a:p>
+          <a:p>
+            <a:pPr marL="0" indent="0">
+              <a:buNone/>
+            </a:pPr>
+            <a:endParaRPr lang="en-US" dirty="0"/>
+          </a:p>
+        </p:txBody>
+      </p:sp>
+    </p:spTree>
+    <p:extLst>
+      <p:ext uri="{BB962C8B-B14F-4D97-AF65-F5344CB8AC3E}">
+        <p14:creationId xmlns:p14="http://schemas.microsoft.com/office/powerpoint/2010/main" val="198818901"/>
+      </p:ext>
+    </p:extLst>
+  </p:cSld>
+  <p:clrMapOvr>
+    <a:masterClrMapping/>
+  </p:clrMapOvr>
+</p:sld>
+</file>
+
+<file path=ppt/slides/slide4.xml><?xml version="1.0" encoding="utf-8"?>
+<p:sld xmlns:a="http://schemas.openxmlformats.org/drawingml/2006/main" xmlns:r="http://schemas.openxmlformats.org/officeDocument/2006/relationships" xmlns:p="http://schemas.openxmlformats.org/presentationml/2006/main">
+  <p:cSld>
+    <p:spTree>
+      <p:nvGrpSpPr>
+        <p:cNvPr id="1" name=""/>
+        <p:cNvGrpSpPr/>
+        <p:nvPr/>
+      </p:nvGrpSpPr>
+      <p:grpSpPr>
+        <a:xfrm>
+          <a:off x="0" y="0"/>
+          <a:ext cx="0" cy="0"/>
+          <a:chOff x="0" y="0"/>
+          <a:chExt cx="0" cy="0"/>
+        </a:xfrm>
+      </p:grpSpPr>
+      <p:sp>
+        <p:nvSpPr>
+          <p:cNvPr id="2" name="Title 1">
+            <a:extLst>
+              <a:ext uri="{FF2B5EF4-FFF2-40B4-BE49-F238E27FC236}">
+                <a16:creationId xmlns:a16="http://schemas.microsoft.com/office/drawing/2014/main" id="{90E0E0DE-DDE0-D901-F03F-DB18775955BF}"/>
+              </a:ext>
+            </a:extLst>
+          </p:cNvPr>
+          <p:cNvSpPr>
+            <a:spLocks noGrp="1"/>
+          </p:cNvSpPr>
+          <p:nvPr>
+            <p:ph type="title"/>
+          </p:nvPr>
+        </p:nvSpPr>
+        <p:spPr/>
+        <p:txBody>
+          <a:bodyPr/>
+          <a:lstStyle/>
+          <a:p>
+            <a:r>
+              <a:rPr lang="en-US" dirty="0"/>
+              <a:t>ADjr0 adjustments in </a:t>
+            </a:r>
+            <a:r>
+              <a:rPr lang="en-US" dirty="0" err="1"/>
+              <a:t>wrf-sfire</a:t>
+            </a:r>
+            <a:endParaRPr lang="en-US" dirty="0"/>
+          </a:p>
+        </p:txBody>
+      </p:sp>
+      <p:sp>
+        <p:nvSpPr>
+          <p:cNvPr id="3" name="Content Placeholder 2">
+            <a:extLst>
+              <a:ext uri="{FF2B5EF4-FFF2-40B4-BE49-F238E27FC236}">
+                <a16:creationId xmlns:a16="http://schemas.microsoft.com/office/drawing/2014/main" id="{72F6BC60-8D5D-CE47-D699-B2F4DC234159}"/>
+              </a:ext>
+            </a:extLst>
+          </p:cNvPr>
+          <p:cNvSpPr>
+            <a:spLocks noGrp="1"/>
+          </p:cNvSpPr>
+          <p:nvPr>
+            <p:ph idx="1"/>
+          </p:nvPr>
+        </p:nvSpPr>
+        <p:spPr/>
+        <p:txBody>
+          <a:bodyPr/>
+          <a:lstStyle/>
+          <a:p>
+            <a:r>
+              <a:rPr lang="en-US" dirty="0"/>
+              <a:t>We ran many more simulations to try to match the observed backfire ROS, but nothing was close  </a:t>
+            </a:r>
+          </a:p>
+          <a:p>
+            <a:pPr lvl="1"/>
+            <a:r>
+              <a:rPr lang="en-US" dirty="0"/>
+              <a:t>With an adjr0 of 0.999, that yielded a backfire ROS of 0.018m/s</a:t>
+            </a:r>
+          </a:p>
+          <a:p>
+            <a:r>
+              <a:rPr lang="en-US" dirty="0"/>
+              <a:t>After looking in the WRF-SFIRE, it appears that the adjr0 is multiplied over and over again in the code, meaning any small adjustment factor will be amplified </a:t>
+            </a:r>
+          </a:p>
+        </p:txBody>
+      </p:sp>
+    </p:spTree>
+    <p:extLst>
+      <p:ext uri="{BB962C8B-B14F-4D97-AF65-F5344CB8AC3E}">
+        <p14:creationId xmlns:p14="http://schemas.microsoft.com/office/powerpoint/2010/main" val="273752130"/>
+      </p:ext>
+    </p:extLst>
+  </p:cSld>
+  <p:clrMapOvr>
+    <a:masterClrMapping/>
+  </p:clrMapOvr>
+</p:sld>
+</file>
+
+<file path=ppt/slides/slide5.xml><?xml version="1.0" encoding="utf-8"?>
+<p:sld xmlns:a="http://schemas.openxmlformats.org/drawingml/2006/main" xmlns:r="http://schemas.openxmlformats.org/officeDocument/2006/relationships" xmlns:p="http://schemas.openxmlformats.org/presentationml/2006/main">
+  <p:cSld>
+    <p:spTree>
+      <p:nvGrpSpPr>
+        <p:cNvPr id="1" name=""/>
+        <p:cNvGrpSpPr/>
+        <p:nvPr/>
+      </p:nvGrpSpPr>
+      <p:grpSpPr>
+        <a:xfrm>
+          <a:off x="0" y="0"/>
+          <a:ext cx="0" cy="0"/>
+          <a:chOff x="0" y="0"/>
+          <a:chExt cx="0" cy="0"/>
+        </a:xfrm>
+      </p:grpSpPr>
+      <p:sp>
+        <p:nvSpPr>
+          <p:cNvPr id="2" name="Title 1">
+            <a:extLst>
+              <a:ext uri="{FF2B5EF4-FFF2-40B4-BE49-F238E27FC236}">
+                <a16:creationId xmlns:a16="http://schemas.microsoft.com/office/drawing/2014/main" id="{F052C21C-EBF6-D051-12BA-2E2A89C53989}"/>
+              </a:ext>
+            </a:extLst>
+          </p:cNvPr>
+          <p:cNvSpPr>
+            <a:spLocks noGrp="1"/>
+          </p:cNvSpPr>
+          <p:nvPr>
+            <p:ph type="title"/>
+          </p:nvPr>
+        </p:nvSpPr>
+        <p:spPr/>
+        <p:txBody>
+          <a:bodyPr/>
+          <a:lstStyle/>
+          <a:p>
+            <a:r>
+              <a:rPr lang="en-US" dirty="0"/>
+              <a:t>How was the backfire ROS calculated?</a:t>
+            </a:r>
+          </a:p>
+        </p:txBody>
+      </p:sp>
+      <p:sp>
+        <p:nvSpPr>
+          <p:cNvPr id="3" name="Content Placeholder 2">
+            <a:extLst>
+              <a:ext uri="{FF2B5EF4-FFF2-40B4-BE49-F238E27FC236}">
+                <a16:creationId xmlns:a16="http://schemas.microsoft.com/office/drawing/2014/main" id="{DB396AF7-FAE5-CCF5-A4D2-6EF8D779F919}"/>
+              </a:ext>
+            </a:extLst>
+          </p:cNvPr>
+          <p:cNvSpPr>
+            <a:spLocks noGrp="1"/>
+          </p:cNvSpPr>
+          <p:nvPr>
+            <p:ph idx="1"/>
+          </p:nvPr>
+        </p:nvSpPr>
+        <p:spPr/>
+        <p:txBody>
+          <a:bodyPr/>
+          <a:lstStyle/>
+          <a:p>
+            <a:r>
+              <a:rPr lang="en-US" dirty="0"/>
+              <a:t>To calculate the backfire ROS, I picked a time in simulation where all the initial ran to (about 850 seconds into the simulation)</a:t>
+            </a:r>
+          </a:p>
+          <a:p>
+            <a:r>
+              <a:rPr lang="en-US" dirty="0"/>
+              <a:t>Then I found a point where the </a:t>
+            </a:r>
+            <a:r>
+              <a:rPr lang="en-US" dirty="0" err="1"/>
+              <a:t>fire_area</a:t>
+            </a:r>
+            <a:r>
+              <a:rPr lang="en-US" dirty="0"/>
+              <a:t> had just touched the grid cell but had not fully engulfed it (</a:t>
+            </a:r>
+            <a:r>
+              <a:rPr lang="en-US" dirty="0" err="1"/>
+              <a:t>fire_area</a:t>
+            </a:r>
+            <a:r>
+              <a:rPr lang="en-US" dirty="0"/>
+              <a:t> &lt; 1)</a:t>
+            </a:r>
+          </a:p>
+          <a:p>
+            <a:r>
+              <a:rPr lang="en-US" dirty="0"/>
+              <a:t>With this location, I calculated the distance to the point using the </a:t>
+            </a:r>
+            <a:r>
+              <a:rPr lang="en-US" dirty="0" err="1"/>
+              <a:t>xlat</a:t>
+            </a:r>
+            <a:r>
+              <a:rPr lang="en-US" dirty="0"/>
+              <a:t> and </a:t>
+            </a:r>
+            <a:r>
+              <a:rPr lang="en-US" dirty="0" err="1"/>
+              <a:t>xlong</a:t>
+            </a:r>
+            <a:r>
+              <a:rPr lang="en-US" dirty="0"/>
+              <a:t> location, and the location of the ignition point since that is specified on the grid</a:t>
+            </a:r>
+          </a:p>
+          <a:p>
+            <a:r>
+              <a:rPr lang="en-US" dirty="0"/>
+              <a:t>With the time and distance, I then calculated the backfire ROS</a:t>
+            </a:r>
+          </a:p>
+        </p:txBody>
+      </p:sp>
+    </p:spTree>
+    <p:extLst>
+      <p:ext uri="{BB962C8B-B14F-4D97-AF65-F5344CB8AC3E}">
+        <p14:creationId xmlns:p14="http://schemas.microsoft.com/office/powerpoint/2010/main" val="4070047842"/>
+      </p:ext>
+    </p:extLst>
+  </p:cSld>
+  <p:clrMapOvr>
+    <a:masterClrMapping/>
+  </p:clrMapOvr>
+</p:sld>
+</file>
+
+<file path=ppt/slides/slide6.xml><?xml version="1.0" encoding="utf-8"?>
+<p:sld xmlns:a="http://schemas.openxmlformats.org/drawingml/2006/main" xmlns:r="http://schemas.openxmlformats.org/officeDocument/2006/relationships" xmlns:p="http://schemas.openxmlformats.org/presentationml/2006/main">
+  <p:cSld>
+    <p:spTree>
+      <p:nvGrpSpPr>
+        <p:cNvPr id="1" name=""/>
+        <p:cNvGrpSpPr/>
+        <p:nvPr/>
+      </p:nvGrpSpPr>
+      <p:grpSpPr>
+        <a:xfrm>
+          <a:off x="0" y="0"/>
+          <a:ext cx="0" cy="0"/>
+          <a:chOff x="0" y="0"/>
+          <a:chExt cx="0" cy="0"/>
+        </a:xfrm>
+      </p:grpSpPr>
+      <p:sp>
+        <p:nvSpPr>
+          <p:cNvPr id="2" name="Title 1">
+            <a:extLst>
+              <a:ext uri="{FF2B5EF4-FFF2-40B4-BE49-F238E27FC236}">
+                <a16:creationId xmlns:a16="http://schemas.microsoft.com/office/drawing/2014/main" id="{8C309094-8A11-4B0E-55CF-ABA779E85CB6}"/>
+              </a:ext>
+            </a:extLst>
+          </p:cNvPr>
+          <p:cNvSpPr>
+            <a:spLocks noGrp="1"/>
+          </p:cNvSpPr>
+          <p:nvPr>
+            <p:ph type="title"/>
+          </p:nvPr>
+        </p:nvSpPr>
+        <p:spPr>
+          <a:xfrm>
+            <a:off x="1608083" y="764373"/>
+            <a:ext cx="9898117" cy="1293028"/>
+          </a:xfrm>
+        </p:spPr>
+        <p:txBody>
+          <a:bodyPr/>
+          <a:lstStyle/>
+          <a:p>
+            <a:r>
+              <a:rPr lang="en-US" dirty="0"/>
+              <a:t>Adjustment factors in </a:t>
+            </a:r>
+            <a:r>
+              <a:rPr lang="en-US" dirty="0" err="1"/>
+              <a:t>wrf-sfire</a:t>
+            </a:r>
+            <a:endParaRPr lang="en-US" dirty="0"/>
+          </a:p>
+        </p:txBody>
+      </p:sp>
+      <p:sp>
+        <p:nvSpPr>
+          <p:cNvPr id="3" name="Content Placeholder 2">
+            <a:extLst>
+              <a:ext uri="{FF2B5EF4-FFF2-40B4-BE49-F238E27FC236}">
+                <a16:creationId xmlns:a16="http://schemas.microsoft.com/office/drawing/2014/main" id="{DF36A171-686B-410D-3DFB-6EE6C2EB8E5A}"/>
+              </a:ext>
+            </a:extLst>
+          </p:cNvPr>
+          <p:cNvSpPr>
+            <a:spLocks noGrp="1"/>
+          </p:cNvSpPr>
+          <p:nvPr>
+            <p:ph idx="1"/>
+          </p:nvPr>
+        </p:nvSpPr>
+        <p:spPr/>
+        <p:txBody>
+          <a:bodyPr/>
+          <a:lstStyle/>
+          <a:p>
+            <a:r>
+              <a:rPr lang="en-US" dirty="0"/>
+              <a:t>To further test the adjustment factors in WRF-SFIRE, I tested the adjustment factors on the small hill case</a:t>
+            </a:r>
+          </a:p>
+          <a:p>
+            <a:pPr lvl="1"/>
+            <a:r>
+              <a:rPr lang="en-US" dirty="0"/>
+              <a:t>This simulation was picked since it had a slope, and it was small enough to be able to run in a couple minutes</a:t>
+            </a:r>
+          </a:p>
+          <a:p>
+            <a:r>
+              <a:rPr lang="en-US" dirty="0"/>
+              <a:t>There were 21 simulations run</a:t>
+            </a:r>
+          </a:p>
+          <a:p>
+            <a:pPr lvl="1"/>
+            <a:r>
+              <a:rPr lang="en-US" dirty="0"/>
+              <a:t>1 simulation was done with no adjustment factors, and the other 20 had different adjustments factors applied in the </a:t>
+            </a:r>
+            <a:r>
+              <a:rPr lang="en-US" dirty="0" err="1"/>
+              <a:t>namelist.fire</a:t>
+            </a:r>
+            <a:endParaRPr lang="en-US" dirty="0"/>
+          </a:p>
+          <a:p>
+            <a:r>
+              <a:rPr lang="en-US" dirty="0"/>
+              <a:t>Example of one of the runs:</a:t>
+            </a:r>
+          </a:p>
+          <a:p>
+            <a:pPr lvl="1"/>
+            <a:endParaRPr lang="en-US" dirty="0"/>
+          </a:p>
+        </p:txBody>
+      </p:sp>
+      <p:pic>
+        <p:nvPicPr>
+          <p:cNvPr id="5" name="Picture 4">
+            <a:extLst>
+              <a:ext uri="{FF2B5EF4-FFF2-40B4-BE49-F238E27FC236}">
+                <a16:creationId xmlns:a16="http://schemas.microsoft.com/office/drawing/2014/main" id="{D9CE0C2E-E035-2BCE-FF70-02B7C362E9F2}"/>
+              </a:ext>
+            </a:extLst>
+          </p:cNvPr>
+          <p:cNvPicPr>
+            <a:picLocks noChangeAspect="1"/>
+          </p:cNvPicPr>
+          <p:nvPr/>
+        </p:nvPicPr>
+        <p:blipFill>
+          <a:blip r:embed="rId2"/>
+          <a:stretch>
+            <a:fillRect/>
+          </a:stretch>
+        </p:blipFill>
+        <p:spPr>
+          <a:xfrm>
+            <a:off x="1075558" y="5250944"/>
+            <a:ext cx="3251200" cy="1104900"/>
+          </a:xfrm>
+          <a:prstGeom prst="rect">
+            <a:avLst/>
+          </a:prstGeom>
+        </p:spPr>
+      </p:pic>
+    </p:spTree>
+    <p:extLst>
+      <p:ext uri="{BB962C8B-B14F-4D97-AF65-F5344CB8AC3E}">
+        <p14:creationId xmlns:p14="http://schemas.microsoft.com/office/powerpoint/2010/main" val="154999995"/>
+      </p:ext>
+    </p:extLst>
+  </p:cSld>
+  <p:clrMapOvr>
+    <a:masterClrMapping/>
+  </p:clrMapOvr>
+</p:sld>
+</file>
+
+<file path=ppt/slides/slide7.xml><?xml version="1.0" encoding="utf-8"?>
+<p:sld xmlns:a="http://schemas.openxmlformats.org/drawingml/2006/main" xmlns:r="http://schemas.openxmlformats.org/officeDocument/2006/relationships" xmlns:p="http://schemas.openxmlformats.org/presentationml/2006/main">
+  <p:cSld>
+    <p:spTree>
+      <p:nvGrpSpPr>
+        <p:cNvPr id="1" name=""/>
+        <p:cNvGrpSpPr/>
+        <p:nvPr/>
+      </p:nvGrpSpPr>
+      <p:grpSpPr>
+        <a:xfrm>
+          <a:off x="0" y="0"/>
+          <a:ext cx="0" cy="0"/>
+          <a:chOff x="0" y="0"/>
+          <a:chExt cx="0" cy="0"/>
+        </a:xfrm>
+      </p:grpSpPr>
+      <p:sp>
+        <p:nvSpPr>
+          <p:cNvPr id="2" name="Title 1">
+            <a:extLst>
+              <a:ext uri="{FF2B5EF4-FFF2-40B4-BE49-F238E27FC236}">
+                <a16:creationId xmlns:a16="http://schemas.microsoft.com/office/drawing/2014/main" id="{0FCCDF40-742E-A389-0A63-74E09DE39F2B}"/>
+              </a:ext>
+            </a:extLst>
+          </p:cNvPr>
+          <p:cNvSpPr>
+            <a:spLocks noGrp="1"/>
+          </p:cNvSpPr>
+          <p:nvPr>
+            <p:ph type="title"/>
+          </p:nvPr>
+        </p:nvSpPr>
+        <p:spPr>
+          <a:xfrm>
+            <a:off x="2070538" y="764373"/>
+            <a:ext cx="9435662" cy="1293028"/>
+          </a:xfrm>
+        </p:spPr>
+        <p:txBody>
+          <a:bodyPr/>
+          <a:lstStyle/>
+          <a:p>
+            <a:r>
+              <a:rPr lang="en-US" dirty="0"/>
+              <a:t>Adjustment factors in </a:t>
+            </a:r>
+            <a:r>
+              <a:rPr lang="en-US" dirty="0" err="1"/>
+              <a:t>wrf-sfire</a:t>
+            </a:r>
+            <a:endParaRPr lang="en-US" dirty="0"/>
+          </a:p>
+        </p:txBody>
+      </p:sp>
+      <p:sp>
+        <p:nvSpPr>
+          <p:cNvPr id="3" name="Content Placeholder 2">
+            <a:extLst>
+              <a:ext uri="{FF2B5EF4-FFF2-40B4-BE49-F238E27FC236}">
+                <a16:creationId xmlns:a16="http://schemas.microsoft.com/office/drawing/2014/main" id="{66506C67-273E-6025-F91B-A7C38B5A3D14}"/>
+              </a:ext>
+            </a:extLst>
+          </p:cNvPr>
+          <p:cNvSpPr>
+            <a:spLocks noGrp="1"/>
+          </p:cNvSpPr>
+          <p:nvPr>
+            <p:ph idx="1"/>
+          </p:nvPr>
+        </p:nvSpPr>
+        <p:spPr/>
+        <p:txBody>
+          <a:bodyPr>
+            <a:normAutofit/>
+          </a:bodyPr>
+          <a:lstStyle/>
+          <a:p>
+            <a:r>
+              <a:rPr lang="en-US" dirty="0"/>
+              <a:t>To see how the rate of spread was impacted, I found three points along the burn plot</a:t>
+            </a:r>
+          </a:p>
+          <a:p>
+            <a:pPr lvl="1"/>
+            <a:r>
+              <a:rPr lang="en-US" dirty="0"/>
+              <a:t>Centre of the hill</a:t>
+            </a:r>
+          </a:p>
+          <a:p>
+            <a:pPr lvl="1"/>
+            <a:r>
+              <a:rPr lang="en-US" dirty="0"/>
+              <a:t>North East part of the hill</a:t>
+            </a:r>
+          </a:p>
+          <a:p>
+            <a:pPr lvl="1"/>
+            <a:r>
+              <a:rPr lang="en-US" dirty="0"/>
+              <a:t>South west part of the hill</a:t>
+            </a:r>
+          </a:p>
+          <a:p>
+            <a:r>
+              <a:rPr lang="en-US" dirty="0"/>
+              <a:t>With these points, I found where the </a:t>
+            </a:r>
+            <a:r>
+              <a:rPr lang="en-US" dirty="0" err="1"/>
+              <a:t>fire_area</a:t>
+            </a:r>
+            <a:r>
+              <a:rPr lang="en-US" dirty="0"/>
+              <a:t> was greater than 0 and the time this occurred</a:t>
+            </a:r>
+          </a:p>
+          <a:p>
+            <a:r>
+              <a:rPr lang="en-US" dirty="0"/>
+              <a:t>Then I found the wind speed at those points at the time the fire reached those points</a:t>
+            </a:r>
+          </a:p>
+          <a:p>
+            <a:r>
+              <a:rPr lang="en-US" dirty="0"/>
+              <a:t>To calculate the distance, I took the ignition point and found the distance from there to those locations</a:t>
+            </a:r>
+          </a:p>
+          <a:p>
+            <a:endParaRPr lang="en-US" dirty="0"/>
+          </a:p>
+        </p:txBody>
+      </p:sp>
+    </p:spTree>
+    <p:extLst>
+      <p:ext uri="{BB962C8B-B14F-4D97-AF65-F5344CB8AC3E}">
+        <p14:creationId xmlns:p14="http://schemas.microsoft.com/office/powerpoint/2010/main" val="2970464427"/>
+      </p:ext>
+    </p:extLst>
+  </p:cSld>
+  <p:clrMapOvr>
+    <a:masterClrMapping/>
+  </p:clrMapOvr>
+</p:sld>
+</file>
+
+<file path=ppt/slides/slide8.xml><?xml version="1.0" encoding="utf-8"?>
+<p:sld xmlns:a="http://schemas.openxmlformats.org/drawingml/2006/main" xmlns:r="http://schemas.openxmlformats.org/officeDocument/2006/relationships" xmlns:p="http://schemas.openxmlformats.org/presentationml/2006/main">
+  <p:cSld>
+    <p:spTree>
+      <p:nvGrpSpPr>
+        <p:cNvPr id="1" name=""/>
+        <p:cNvGrpSpPr/>
+        <p:nvPr/>
+      </p:nvGrpSpPr>
+      <p:grpSpPr>
+        <a:xfrm>
+          <a:off x="0" y="0"/>
+          <a:ext cx="0" cy="0"/>
+          <a:chOff x="0" y="0"/>
+          <a:chExt cx="0" cy="0"/>
+        </a:xfrm>
+      </p:grpSpPr>
+      <p:sp>
+        <p:nvSpPr>
+          <p:cNvPr id="2" name="Title 1">
+            <a:extLst>
+              <a:ext uri="{FF2B5EF4-FFF2-40B4-BE49-F238E27FC236}">
+                <a16:creationId xmlns:a16="http://schemas.microsoft.com/office/drawing/2014/main" id="{FEC91CC5-164D-D3A4-A9ED-A97352F38D77}"/>
+              </a:ext>
+            </a:extLst>
+          </p:cNvPr>
+          <p:cNvSpPr>
+            <a:spLocks noGrp="1"/>
+          </p:cNvSpPr>
+          <p:nvPr>
+            <p:ph type="title"/>
+          </p:nvPr>
+        </p:nvSpPr>
+        <p:spPr/>
+        <p:txBody>
+          <a:bodyPr/>
+          <a:lstStyle/>
+          <a:p>
+            <a:r>
+              <a:rPr lang="en-US" dirty="0"/>
+              <a:t>Adjustment factors results </a:t>
+            </a:r>
+          </a:p>
+        </p:txBody>
+      </p:sp>
+      <p:pic>
+        <p:nvPicPr>
+          <p:cNvPr id="4" name="Picture 3">
+            <a:extLst>
+              <a:ext uri="{FF2B5EF4-FFF2-40B4-BE49-F238E27FC236}">
+                <a16:creationId xmlns:a16="http://schemas.microsoft.com/office/drawing/2014/main" id="{067370A0-C040-EAF7-6E99-9E5295CFC5C5}"/>
+              </a:ext>
+            </a:extLst>
+          </p:cNvPr>
+          <p:cNvPicPr>
+            <a:picLocks noChangeAspect="1"/>
+          </p:cNvPicPr>
+          <p:nvPr/>
+        </p:nvPicPr>
+        <p:blipFill>
+          <a:blip r:embed="rId2"/>
+          <a:stretch>
+            <a:fillRect/>
+          </a:stretch>
+        </p:blipFill>
+        <p:spPr>
+          <a:xfrm>
+            <a:off x="15409" y="3429000"/>
+            <a:ext cx="12161181" cy="1861857"/>
+          </a:xfrm>
+          <a:prstGeom prst="rect">
+            <a:avLst/>
+          </a:prstGeom>
+        </p:spPr>
+      </p:pic>
+      <p:sp>
+        <p:nvSpPr>
+          <p:cNvPr id="5" name="TextBox 4">
+            <a:extLst>
+              <a:ext uri="{FF2B5EF4-FFF2-40B4-BE49-F238E27FC236}">
+                <a16:creationId xmlns:a16="http://schemas.microsoft.com/office/drawing/2014/main" id="{FCFEE05A-93EC-9AAD-43DC-99B8BA0D79BD}"/>
+              </a:ext>
+            </a:extLst>
+          </p:cNvPr>
+          <p:cNvSpPr txBox="1"/>
+          <p:nvPr/>
+        </p:nvSpPr>
+        <p:spPr>
+          <a:xfrm>
+            <a:off x="405353" y="2262433"/>
+            <a:ext cx="5995447" cy="923330"/>
+          </a:xfrm>
+          <a:prstGeom prst="rect">
+            <a:avLst/>
+          </a:prstGeom>
+          <a:noFill/>
+        </p:spPr>
+        <p:txBody>
+          <a:bodyPr wrap="square" rtlCol="0">
+            <a:spAutoFit/>
+          </a:bodyPr>
+          <a:lstStyle/>
+          <a:p>
+            <a:r>
+              <a:rPr lang="en-US" dirty="0"/>
+              <a:t>This excel sheet can be found on my </a:t>
+            </a:r>
+            <a:r>
+              <a:rPr lang="en-US" dirty="0" err="1"/>
+              <a:t>github</a:t>
+            </a:r>
+            <a:r>
+              <a:rPr lang="en-US" dirty="0"/>
+              <a:t> at: </a:t>
+            </a:r>
+          </a:p>
+          <a:p>
+            <a:r>
+              <a:rPr lang="en-US" dirty="0"/>
+              <a:t>The </a:t>
+            </a:r>
+            <a:r>
+              <a:rPr lang="en-US" dirty="0" err="1"/>
+              <a:t>Rothermel</a:t>
+            </a:r>
+            <a:r>
+              <a:rPr lang="en-US" dirty="0"/>
+              <a:t> codes can be found at: </a:t>
+            </a:r>
+          </a:p>
+          <a:p>
+            <a:r>
+              <a:rPr lang="en-US" dirty="0"/>
+              <a:t>The modified fuel code can be found at: </a:t>
+            </a:r>
+          </a:p>
+        </p:txBody>
+      </p:sp>
+    </p:spTree>
+    <p:extLst>
+      <p:ext uri="{BB962C8B-B14F-4D97-AF65-F5344CB8AC3E}">
+        <p14:creationId xmlns:p14="http://schemas.microsoft.com/office/powerpoint/2010/main" val="3891197934"/>
+      </p:ext>
+    </p:extLst>
+  </p:cSld>
+  <p:clrMapOvr>
+    <a:masterClrMapping/>
+  </p:clrMapOvr>
+</p:sld>
+</file>
+
+<file path=ppt/slides/slide9.xml><?xml version="1.0" encoding="utf-8"?>
+<p:sld xmlns:a="http://schemas.openxmlformats.org/drawingml/2006/main" xmlns:r="http://schemas.openxmlformats.org/officeDocument/2006/relationships" xmlns:p="http://schemas.openxmlformats.org/presentationml/2006/main">
+  <p:cSld>
+    <p:spTree>
+      <p:nvGrpSpPr>
+        <p:cNvPr id="1" name=""/>
+        <p:cNvGrpSpPr/>
+        <p:nvPr/>
+      </p:nvGrpSpPr>
+      <p:grpSpPr>
+        <a:xfrm>
+          <a:off x="0" y="0"/>
+          <a:ext cx="0" cy="0"/>
+          <a:chOff x="0" y="0"/>
+          <a:chExt cx="0" cy="0"/>
+        </a:xfrm>
+      </p:grpSpPr>
+      <p:sp>
+        <p:nvSpPr>
+          <p:cNvPr id="2" name="Title 1">
+            <a:extLst>
+              <a:ext uri="{FF2B5EF4-FFF2-40B4-BE49-F238E27FC236}">
+                <a16:creationId xmlns:a16="http://schemas.microsoft.com/office/drawing/2014/main" id="{0FCCDF40-742E-A389-0A63-74E09DE39F2B}"/>
+              </a:ext>
+            </a:extLst>
+          </p:cNvPr>
+          <p:cNvSpPr>
+            <a:spLocks noGrp="1"/>
+          </p:cNvSpPr>
+          <p:nvPr>
+            <p:ph type="title"/>
+          </p:nvPr>
+        </p:nvSpPr>
+        <p:spPr>
+          <a:xfrm>
+            <a:off x="2070538" y="764373"/>
+            <a:ext cx="9435662" cy="1293028"/>
+          </a:xfrm>
+        </p:spPr>
+        <p:txBody>
+          <a:bodyPr/>
+          <a:lstStyle/>
+          <a:p>
+            <a:r>
+              <a:rPr lang="en-US" dirty="0"/>
+              <a:t>Adjustment factors in </a:t>
+            </a:r>
+            <a:r>
+              <a:rPr lang="en-US" dirty="0" err="1"/>
+              <a:t>wrf-sfire</a:t>
+            </a:r>
+            <a:endParaRPr lang="en-US" dirty="0"/>
+          </a:p>
+        </p:txBody>
+      </p:sp>
+      <p:sp>
+        <p:nvSpPr>
+          <p:cNvPr id="3" name="Content Placeholder 2">
+            <a:extLst>
+              <a:ext uri="{FF2B5EF4-FFF2-40B4-BE49-F238E27FC236}">
+                <a16:creationId xmlns:a16="http://schemas.microsoft.com/office/drawing/2014/main" id="{66506C67-273E-6025-F91B-A7C38B5A3D14}"/>
+              </a:ext>
+            </a:extLst>
+          </p:cNvPr>
+          <p:cNvSpPr>
+            <a:spLocks noGrp="1"/>
+          </p:cNvSpPr>
+          <p:nvPr>
+            <p:ph idx="1"/>
+          </p:nvPr>
+        </p:nvSpPr>
+        <p:spPr/>
+        <p:txBody>
+          <a:bodyPr>
+            <a:normAutofit/>
+          </a:bodyPr>
+          <a:lstStyle/>
+          <a:p>
+            <a:r>
+              <a:rPr lang="en-US" dirty="0"/>
+              <a:t>For comparison, I have the ”original” </a:t>
+            </a:r>
+            <a:r>
+              <a:rPr lang="en-US" dirty="0" err="1"/>
+              <a:t>Rothermel</a:t>
+            </a:r>
+            <a:r>
+              <a:rPr lang="en-US" dirty="0"/>
+              <a:t> code (all that was changed is the model doesn’t max out at 6m/s) and the ROS variable from the model to see how the modified </a:t>
+            </a:r>
+            <a:r>
+              <a:rPr lang="en-US" dirty="0" err="1"/>
+              <a:t>Rothermel</a:t>
+            </a:r>
+            <a:r>
+              <a:rPr lang="en-US" dirty="0"/>
+              <a:t> model compares</a:t>
+            </a:r>
+          </a:p>
+          <a:p>
+            <a:pPr lvl="1"/>
+            <a:r>
+              <a:rPr lang="en-US" dirty="0"/>
+              <a:t>The modified </a:t>
+            </a:r>
+            <a:r>
+              <a:rPr lang="en-US" dirty="0" err="1"/>
+              <a:t>Rothermel</a:t>
+            </a:r>
+            <a:r>
+              <a:rPr lang="en-US" dirty="0"/>
+              <a:t> code takes the adjustment factors as an inputs, and is integrated in the code during the rate of spread calculation</a:t>
+            </a:r>
+          </a:p>
+          <a:p>
+            <a:pPr lvl="1"/>
+            <a:r>
+              <a:rPr lang="en-US" dirty="0"/>
+              <a:t>Please note: the columns that do not have any data are because the simulation never reached those locations on the burn plot</a:t>
+            </a:r>
+          </a:p>
+          <a:p>
+            <a:endParaRPr lang="en-US" dirty="0"/>
+          </a:p>
+        </p:txBody>
+      </p:sp>
+    </p:spTree>
+    <p:extLst>
+      <p:ext uri="{BB962C8B-B14F-4D97-AF65-F5344CB8AC3E}">
+        <p14:creationId xmlns:p14="http://schemas.microsoft.com/office/powerpoint/2010/main" val="2195374168"/>
       </p:ext>
     </p:extLst>
   </p:cSld>

</xml_diff>

<commit_message>
updating adjustment factors powerpoint and adding in balbi powerpoint
</commit_message>
<xml_diff>
--- a/Presentations/Adjustment_Factors.pptx
+++ b/Presentations/Adjustment_Factors.pptx
@@ -6078,7 +6078,7 @@
         <p:spPr>
           <a:xfrm>
             <a:off x="396209" y="1818612"/>
-            <a:ext cx="10942351" cy="3416320"/>
+            <a:ext cx="10942351" cy="3370153"/>
           </a:xfrm>
           <a:prstGeom prst="rect">
             <a:avLst/>
@@ -6092,88 +6092,104 @@
           <a:lstStyle/>
           <a:p>
             <a:r>
-              <a:rPr lang="en-US" dirty="0"/>
+              <a:rPr lang="en-US" sz="1500" dirty="0"/>
               <a:t>This excel sheet can be found on my </a:t>
             </a:r>
             <a:r>
-              <a:rPr lang="en-US" dirty="0" err="1"/>
+              <a:rPr lang="en-US" sz="1500" dirty="0" err="1"/>
               <a:t>github</a:t>
             </a:r>
             <a:r>
-              <a:rPr lang="en-US" dirty="0"/>
+              <a:rPr lang="en-US" sz="1500" dirty="0"/>
               <a:t> at: </a:t>
             </a:r>
             <a:r>
-              <a:rPr lang="en-US" dirty="0">
+              <a:rPr lang="en-US" sz="1500" dirty="0">
                 <a:hlinkClick r:id="rId3"/>
               </a:rPr>
               <a:t>https://github.com/Jeremy-Benik/Hill_Runs/blob/main/ROS_calculations.xlsx</a:t>
             </a:r>
-            <a:endParaRPr lang="en-US" dirty="0"/>
-          </a:p>
-          <a:p>
-            <a:endParaRPr lang="en-US" dirty="0"/>
-          </a:p>
-          <a:p>
-            <a:r>
-              <a:rPr lang="en-US" dirty="0"/>
+            <a:endParaRPr lang="en-US" sz="1500" dirty="0"/>
+          </a:p>
+          <a:p>
+            <a:endParaRPr lang="en-US" sz="1500" dirty="0"/>
+          </a:p>
+          <a:p>
+            <a:r>
+              <a:rPr lang="en-US" sz="1500" dirty="0"/>
               <a:t>The modified </a:t>
             </a:r>
             <a:r>
-              <a:rPr lang="en-US" dirty="0" err="1"/>
+              <a:rPr lang="en-US" sz="1500" dirty="0" err="1"/>
               <a:t>Rothermel</a:t>
             </a:r>
             <a:r>
-              <a:rPr lang="en-US" dirty="0"/>
+              <a:rPr lang="en-US" sz="1500" dirty="0"/>
               <a:t> code can be found at: </a:t>
             </a:r>
             <a:r>
-              <a:rPr lang="en-US" dirty="0">
+              <a:rPr lang="en-US" sz="1500" dirty="0">
                 <a:hlinkClick r:id="rId4"/>
               </a:rPr>
               <a:t>https://github.com/Jeremy-Benik/Hill_Runs/blob/main/Codes/ros_rothermel.m</a:t>
             </a:r>
-            <a:endParaRPr lang="en-US" dirty="0"/>
-          </a:p>
-          <a:p>
-            <a:endParaRPr lang="en-US" dirty="0"/>
-          </a:p>
-          <a:p>
-            <a:r>
-              <a:rPr lang="en-US" dirty="0"/>
+            <a:endParaRPr lang="en-US" sz="1500" dirty="0"/>
+          </a:p>
+          <a:p>
+            <a:endParaRPr lang="en-US" sz="1500" dirty="0"/>
+          </a:p>
+          <a:p>
+            <a:r>
+              <a:rPr lang="en-US" sz="1500" dirty="0"/>
               <a:t>The original </a:t>
             </a:r>
             <a:r>
-              <a:rPr lang="en-US" dirty="0" err="1"/>
+              <a:rPr lang="en-US" sz="1500" dirty="0" err="1"/>
               <a:t>Rothermel</a:t>
             </a:r>
             <a:r>
-              <a:rPr lang="en-US" dirty="0"/>
+              <a:rPr lang="en-US" sz="1500" dirty="0"/>
               <a:t> code can be found at: </a:t>
             </a:r>
             <a:r>
-              <a:rPr lang="en-US" dirty="0">
+              <a:rPr lang="en-US" sz="1500" dirty="0">
                 <a:hlinkClick r:id="rId5"/>
               </a:rPr>
               <a:t>https://github.com/Jeremy-Benik/Hill_Runs/blob/main/Codes/ros_rothermel_og.m</a:t>
             </a:r>
-            <a:endParaRPr lang="en-US" dirty="0"/>
-          </a:p>
-          <a:p>
-            <a:endParaRPr lang="en-US" dirty="0"/>
-          </a:p>
-          <a:p>
-            <a:r>
-              <a:rPr lang="en-US" dirty="0"/>
-              <a:t>The modified fuel code can be found at: </a:t>
-            </a:r>
-            <a:r>
-              <a:rPr lang="en-US" dirty="0">
+            <a:endParaRPr lang="en-US" sz="1500" dirty="0"/>
+          </a:p>
+          <a:p>
+            <a:endParaRPr lang="en-US" sz="1500" dirty="0"/>
+          </a:p>
+          <a:p>
+            <a:r>
+              <a:rPr lang="en-US" sz="1500" dirty="0"/>
+              <a:t>The sensitivity analysis code can be found at: </a:t>
+            </a:r>
+            <a:r>
+              <a:rPr lang="en-US" sz="1500" dirty="0">
                 <a:hlinkClick r:id="rId6"/>
               </a:rPr>
+              <a:t>https://github.com/Jeremy-Benik/Hill_Runs/blob/main/Codes/adjustment_factor_sensitivity.m</a:t>
+            </a:r>
+            <a:endParaRPr lang="en-US" sz="1500" dirty="0"/>
+          </a:p>
+          <a:p>
+            <a:endParaRPr lang="en-US" sz="1500" dirty="0"/>
+          </a:p>
+          <a:p>
+            <a:r>
+              <a:rPr lang="en-US" sz="1500" dirty="0"/>
+              <a:t>The modified fuel code can be found at: </a:t>
+            </a:r>
+            <a:r>
+              <a:rPr lang="en-US" sz="1500" dirty="0">
+                <a:hlinkClick r:id="rId7"/>
+              </a:rPr>
               <a:t>https://github.com/Jeremy-Benik/Hill_Runs/blob/main/Codes/fuels.m</a:t>
             </a:r>
-            <a:endParaRPr lang="en-US" dirty="0"/>
+            <a:endParaRPr lang="en-US" sz="1500" dirty="0"/>
           </a:p>
           <a:p>
             <a:endParaRPr lang="en-US" dirty="0"/>

</xml_diff>